<commit_message>
KPK Homework  + OS + some JS Updates
</commit_message>
<xml_diff>
--- a/QA/Lectures/2. Code Formatting.pptx
+++ b/QA/Lectures/2. Code Formatting.pptx
@@ -317,7 +317,7 @@
             <a:fld id="{3BF7C7B5-275F-4D1F-9AB4-9255447DBC73}" type="datetimeFigureOut">
               <a:rPr lang="en-US"/>
               <a:pPr/>
-              <a:t>08.04.2013</a:t>
+              <a:t>09.04.2013</a:t>
             </a:fld>
             <a:endParaRPr lang="en-US" dirty="0"/>
           </a:p>
@@ -548,7 +548,7 @@
             <a:fld id="{9B46F231-FB2B-4655-A644-E2477325E686}" type="datetimeFigureOut">
               <a:rPr lang="en-US"/>
               <a:pPr/>
-              <a:t>08.04.2013</a:t>
+              <a:t>09.04.2013</a:t>
             </a:fld>
             <a:endParaRPr lang="en-US" dirty="0"/>
           </a:p>
@@ -7514,7 +7514,7 @@
         </p:nvSpPr>
         <p:spPr>
           <a:xfrm>
-            <a:off x="228600" y="914400"/>
+            <a:off x="228600" y="762000"/>
             <a:ext cx="8686800" cy="5638800"/>
           </a:xfrm>
         </p:spPr>
@@ -7574,8 +7574,8 @@
         </p:nvSpPr>
         <p:spPr bwMode="auto">
           <a:xfrm>
-            <a:off x="381000" y="1981200"/>
-            <a:ext cx="8382000" cy="4539704"/>
+            <a:off x="381000" y="1752600"/>
+            <a:ext cx="8382000" cy="4801314"/>
           </a:xfrm>
           <a:prstGeom prst="rect">
             <a:avLst/>
@@ -7629,7 +7629,38 @@
                 <a:latin typeface="Consolas" pitchFamily="49" charset="0"/>
                 <a:cs typeface="Consolas" pitchFamily="49" charset="0"/>
               </a:rPr>
-              <a:t>private List&lt;Report&gt; PrepareReports() {</a:t>
+              <a:t>private List&lt;Report&gt; PrepareReports()</a:t>
+            </a:r>
+          </a:p>
+          <a:p>
+            <a:pPr eaLnBrk="0" hangingPunct="0">
+              <a:spcBef>
+                <a:spcPts val="0"/>
+              </a:spcBef>
+              <a:buClr>
+                <a:schemeClr val="accent5">
+                  <a:lumMod val="40000"/>
+                  <a:lumOff val="60000"/>
+                </a:schemeClr>
+              </a:buClr>
+              <a:buSzPct val="70000"/>
+            </a:pPr>
+            <a:r>
+              <a:rPr lang="en-US" sz="1700" b="1" noProof="1" smtClean="0">
+                <a:solidFill>
+                  <a:srgbClr val="8CF4F2"/>
+                </a:solidFill>
+                <a:effectLst>
+                  <a:outerShdw blurRad="38100" dist="38100" dir="2700000" algn="tl">
+                    <a:srgbClr val="000000">
+                      <a:alpha val="43137"/>
+                    </a:srgbClr>
+                  </a:outerShdw>
+                </a:effectLst>
+                <a:latin typeface="Consolas" pitchFamily="49" charset="0"/>
+                <a:cs typeface="Consolas" pitchFamily="49" charset="0"/>
+              </a:rPr>
+              <a:t>{</a:t>
             </a:r>
           </a:p>
           <a:p>
@@ -10332,7 +10363,7 @@
         </p:nvSpPr>
         <p:spPr bwMode="auto">
           <a:xfrm>
-            <a:off x="609600" y="1753850"/>
+            <a:off x="609600" y="1600200"/>
             <a:ext cx="7924800" cy="1323439"/>
           </a:xfrm>
           <a:prstGeom prst="rect">
@@ -13264,29 +13295,7 @@
                 <a:latin typeface="Consolas" pitchFamily="49" charset="0"/>
                 <a:cs typeface="Consolas" pitchFamily="49" charset="0"/>
               </a:rPr>
-              <a:t>    new DictionaryEntry&lt;K, V&gt;(</a:t>
-            </a:r>
-          </a:p>
-          <a:p>
-            <a:r>
-              <a:rPr lang="en-US" sz="2200" b="1" noProof="1" smtClean="0">
-                <a:solidFill>
-                  <a:schemeClr val="accent5">
-                    <a:lumMod val="20000"/>
-                    <a:lumOff val="80000"/>
-                  </a:schemeClr>
-                </a:solidFill>
-                <a:effectLst>
-                  <a:outerShdw blurRad="38100" dist="38100" dir="2700000" algn="tl">
-                    <a:srgbClr val="000000">
-                      <a:alpha val="43137"/>
-                    </a:srgbClr>
-                  </a:outerShdw>
-                </a:effectLst>
-                <a:latin typeface="Consolas" pitchFamily="49" charset="0"/>
-                <a:cs typeface="Consolas" pitchFamily="49" charset="0"/>
-              </a:rPr>
-              <a:t>    oldEntry.Key, oldEntry.Value);</a:t>
+              <a:t>    new DictionaryEntry&lt;K, V&gt;(oldEntry.Key,        					oldEntry.Value);</a:t>
             </a:r>
           </a:p>
         </p:txBody>
@@ -15650,7 +15659,7 @@
                   </a:schemeClr>
                 </a:solidFill>
               </a:rPr>
-              <a:t>[Shift+Ctrl+F]</a:t>
+              <a:t>[Ctrl+K+D]</a:t>
             </a:r>
           </a:p>
           <a:p>
@@ -16200,12 +16209,8 @@
           <a:lstStyle/>
           <a:p>
             <a:r>
-              <a:rPr lang="en-US" smtClean="0"/>
-              <a:t>C# Programming </a:t>
-            </a:r>
-            <a:r>
               <a:rPr lang="en-US" dirty="0" smtClean="0"/>
-              <a:t>@ Telerik Academy</a:t>
+              <a:t>C# Programming @ Telerik Academy</a:t>
             </a:r>
           </a:p>
           <a:p>

</xml_diff>